<commit_message>
Add WBGT Chronic Heat Model (#129)
* Updates made to the WBGT model to add variance by asset type. Additionally changes
to hazard data to account for windows/unix differences.
Signed-off-by: MLevinMazars <Michael.Levin@Mazars.co.uk>

* Updated Model documentation and removing piece of code used for testing.

Signed-off-by: MLevinMazars <Michael.Levin@Mazars.co.uk>

* Merge document updates.

Signed-off-by: Joe Moorhouse <joe.moorhouse@gmail.com>

---------

Signed-off-by: MLevinMazars <Michael.Levin@Mazars.co.uk>
Signed-off-by: Joe Moorhouse <joe.moorhouse@gmail.com>
Co-authored-by: MLevinMazars <Michael.Levin@Mazars.co.uk>
</commit_message>
<xml_diff>
--- a/methodology/plots/top_level_view.pptx
+++ b/methodology/plots/top_level_view.pptx
@@ -261,7 +261,7 @@
           <a:p>
             <a:fld id="{7CFC6544-A9AE-4A12-916D-21615692FB1B}" type="datetimeFigureOut">
               <a:rPr lang="en-GB" smtClean="0"/>
-              <a:t>18/10/2021</a:t>
+              <a:t>03/04/2023</a:t>
             </a:fld>
             <a:endParaRPr lang="en-GB"/>
           </a:p>
@@ -461,7 +461,7 @@
           <a:p>
             <a:fld id="{7CFC6544-A9AE-4A12-916D-21615692FB1B}" type="datetimeFigureOut">
               <a:rPr lang="en-GB" smtClean="0"/>
-              <a:t>18/10/2021</a:t>
+              <a:t>03/04/2023</a:t>
             </a:fld>
             <a:endParaRPr lang="en-GB"/>
           </a:p>
@@ -671,7 +671,7 @@
           <a:p>
             <a:fld id="{7CFC6544-A9AE-4A12-916D-21615692FB1B}" type="datetimeFigureOut">
               <a:rPr lang="en-GB" smtClean="0"/>
-              <a:t>18/10/2021</a:t>
+              <a:t>03/04/2023</a:t>
             </a:fld>
             <a:endParaRPr lang="en-GB"/>
           </a:p>
@@ -871,7 +871,7 @@
           <a:p>
             <a:fld id="{7CFC6544-A9AE-4A12-916D-21615692FB1B}" type="datetimeFigureOut">
               <a:rPr lang="en-GB" smtClean="0"/>
-              <a:t>18/10/2021</a:t>
+              <a:t>03/04/2023</a:t>
             </a:fld>
             <a:endParaRPr lang="en-GB"/>
           </a:p>
@@ -1147,7 +1147,7 @@
           <a:p>
             <a:fld id="{7CFC6544-A9AE-4A12-916D-21615692FB1B}" type="datetimeFigureOut">
               <a:rPr lang="en-GB" smtClean="0"/>
-              <a:t>18/10/2021</a:t>
+              <a:t>03/04/2023</a:t>
             </a:fld>
             <a:endParaRPr lang="en-GB"/>
           </a:p>
@@ -1415,7 +1415,7 @@
           <a:p>
             <a:fld id="{7CFC6544-A9AE-4A12-916D-21615692FB1B}" type="datetimeFigureOut">
               <a:rPr lang="en-GB" smtClean="0"/>
-              <a:t>18/10/2021</a:t>
+              <a:t>03/04/2023</a:t>
             </a:fld>
             <a:endParaRPr lang="en-GB"/>
           </a:p>
@@ -1830,7 +1830,7 @@
           <a:p>
             <a:fld id="{7CFC6544-A9AE-4A12-916D-21615692FB1B}" type="datetimeFigureOut">
               <a:rPr lang="en-GB" smtClean="0"/>
-              <a:t>18/10/2021</a:t>
+              <a:t>03/04/2023</a:t>
             </a:fld>
             <a:endParaRPr lang="en-GB"/>
           </a:p>
@@ -1972,7 +1972,7 @@
           <a:p>
             <a:fld id="{7CFC6544-A9AE-4A12-916D-21615692FB1B}" type="datetimeFigureOut">
               <a:rPr lang="en-GB" smtClean="0"/>
-              <a:t>18/10/2021</a:t>
+              <a:t>03/04/2023</a:t>
             </a:fld>
             <a:endParaRPr lang="en-GB"/>
           </a:p>
@@ -2085,7 +2085,7 @@
           <a:p>
             <a:fld id="{7CFC6544-A9AE-4A12-916D-21615692FB1B}" type="datetimeFigureOut">
               <a:rPr lang="en-GB" smtClean="0"/>
-              <a:t>18/10/2021</a:t>
+              <a:t>03/04/2023</a:t>
             </a:fld>
             <a:endParaRPr lang="en-GB"/>
           </a:p>
@@ -2398,7 +2398,7 @@
           <a:p>
             <a:fld id="{7CFC6544-A9AE-4A12-916D-21615692FB1B}" type="datetimeFigureOut">
               <a:rPr lang="en-GB" smtClean="0"/>
-              <a:t>18/10/2021</a:t>
+              <a:t>03/04/2023</a:t>
             </a:fld>
             <a:endParaRPr lang="en-GB"/>
           </a:p>
@@ -2687,7 +2687,7 @@
           <a:p>
             <a:fld id="{7CFC6544-A9AE-4A12-916D-21615692FB1B}" type="datetimeFigureOut">
               <a:rPr lang="en-GB" smtClean="0"/>
-              <a:t>18/10/2021</a:t>
+              <a:t>03/04/2023</a:t>
             </a:fld>
             <a:endParaRPr lang="en-GB"/>
           </a:p>
@@ -2930,7 +2930,7 @@
           <a:p>
             <a:fld id="{7CFC6544-A9AE-4A12-916D-21615692FB1B}" type="datetimeFigureOut">
               <a:rPr lang="en-GB" smtClean="0"/>
-              <a:t>18/10/2021</a:t>
+              <a:t>03/04/2023</a:t>
             </a:fld>
             <a:endParaRPr lang="en-GB"/>
           </a:p>
@@ -3349,6 +3349,64 @@
       </p:grpSpPr>
       <p:sp>
         <p:nvSpPr>
+          <p:cNvPr id="135" name="Rounded Rectangle 134">
+            <a:extLst>
+              <a:ext uri="{FF2B5EF4-FFF2-40B4-BE49-F238E27FC236}">
+                <a16:creationId xmlns:a16="http://schemas.microsoft.com/office/drawing/2014/main" id="{00BC6A81-16C9-7937-DA95-A85F9F8CFBDB}"/>
+              </a:ext>
+            </a:extLst>
+          </p:cNvPr>
+          <p:cNvSpPr/>
+          <p:nvPr/>
+        </p:nvSpPr>
+        <p:spPr>
+          <a:xfrm>
+            <a:off x="2929406" y="4682810"/>
+            <a:ext cx="5720064" cy="1832242"/>
+          </a:xfrm>
+          <a:prstGeom prst="roundRect">
+            <a:avLst/>
+          </a:prstGeom>
+          <a:solidFill>
+            <a:schemeClr val="accent5">
+              <a:alpha val="20000"/>
+            </a:schemeClr>
+          </a:solidFill>
+          <a:ln>
+            <a:solidFill>
+              <a:schemeClr val="accent5">
+                <a:lumMod val="75000"/>
+              </a:schemeClr>
+            </a:solidFill>
+          </a:ln>
+        </p:spPr>
+        <p:style>
+          <a:lnRef idx="2">
+            <a:schemeClr val="accent1">
+              <a:shade val="50000"/>
+            </a:schemeClr>
+          </a:lnRef>
+          <a:fillRef idx="1">
+            <a:schemeClr val="accent1"/>
+          </a:fillRef>
+          <a:effectRef idx="0">
+            <a:schemeClr val="accent1"/>
+          </a:effectRef>
+          <a:fontRef idx="minor">
+            <a:schemeClr val="lt1"/>
+          </a:fontRef>
+        </p:style>
+        <p:txBody>
+          <a:bodyPr rtlCol="0" anchor="ctr"/>
+          <a:lstStyle/>
+          <a:p>
+            <a:pPr algn="ctr"/>
+            <a:endParaRPr lang="en-US" dirty="0"/>
+          </a:p>
+        </p:txBody>
+      </p:sp>
+      <p:sp>
+        <p:nvSpPr>
           <p:cNvPr id="6" name="Rectangle 5">
             <a:extLst>
               <a:ext uri="{FF2B5EF4-FFF2-40B4-BE49-F238E27FC236}">
@@ -3540,55 +3598,6 @@
           </a:p>
         </p:txBody>
       </p:sp>
-      <p:sp>
-        <p:nvSpPr>
-          <p:cNvPr id="5" name="Flowchart: Multidocument 4">
-            <a:extLst>
-              <a:ext uri="{FF2B5EF4-FFF2-40B4-BE49-F238E27FC236}">
-                <a16:creationId xmlns:a16="http://schemas.microsoft.com/office/drawing/2014/main" id="{D6F6B431-FC54-4874-AA34-80527BE2700A}"/>
-              </a:ext>
-            </a:extLst>
-          </p:cNvPr>
-          <p:cNvSpPr/>
-          <p:nvPr/>
-        </p:nvSpPr>
-        <p:spPr>
-          <a:xfrm flipH="1">
-            <a:off x="6580084" y="2556760"/>
-            <a:ext cx="1513168" cy="1028895"/>
-          </a:xfrm>
-          <a:prstGeom prst="flowChartMultidocument">
-            <a:avLst/>
-          </a:prstGeom>
-        </p:spPr>
-        <p:style>
-          <a:lnRef idx="2">
-            <a:schemeClr val="accent6">
-              <a:shade val="50000"/>
-            </a:schemeClr>
-          </a:lnRef>
-          <a:fillRef idx="1">
-            <a:schemeClr val="accent6"/>
-          </a:fillRef>
-          <a:effectRef idx="0">
-            <a:schemeClr val="accent6"/>
-          </a:effectRef>
-          <a:fontRef idx="minor">
-            <a:schemeClr val="lt1"/>
-          </a:fontRef>
-        </p:style>
-        <p:txBody>
-          <a:bodyPr rtlCol="0" anchor="ctr"/>
-          <a:lstStyle/>
-          <a:p>
-            <a:pPr algn="ctr"/>
-            <a:r>
-              <a:rPr lang="en-GB" sz="1600" dirty="0"/>
-              <a:t>Vulnerability distributions</a:t>
-            </a:r>
-          </a:p>
-        </p:txBody>
-      </p:sp>
       <p:grpSp>
         <p:nvGrpSpPr>
           <p:cNvPr id="21" name="Group 20">
@@ -3603,7 +3612,7 @@
         </p:nvGrpSpPr>
         <p:grpSpPr>
           <a:xfrm>
-            <a:off x="4380722" y="2472046"/>
+            <a:off x="7801373" y="2425649"/>
             <a:ext cx="1616060" cy="1028895"/>
             <a:chOff x="3687769" y="3917530"/>
             <a:chExt cx="1616060" cy="1028895"/>
@@ -3745,14 +3754,7 @@
               <a:pPr algn="ctr"/>
               <a:r>
                 <a:rPr lang="en-GB" sz="1600" dirty="0"/>
-                <a:t>Exposure/</a:t>
-              </a:r>
-            </a:p>
-            <a:p>
-              <a:pPr algn="ctr"/>
-              <a:r>
-                <a:rPr lang="en-GB" sz="1600" dirty="0"/>
-                <a:t>vulnerability models</a:t>
+                <a:t>Vulnerability models</a:t>
               </a:r>
             </a:p>
           </p:txBody>
@@ -3920,61 +3922,12 @@
               <a:pPr algn="ctr"/>
               <a:r>
                 <a:rPr lang="en-GB" sz="1600" dirty="0"/>
-                <a:t>Hazard models</a:t>
+                <a:t>Physical models</a:t>
               </a:r>
             </a:p>
           </p:txBody>
         </p:sp>
       </p:grpSp>
-      <p:sp>
-        <p:nvSpPr>
-          <p:cNvPr id="20" name="Flowchart: Multidocument 19">
-            <a:extLst>
-              <a:ext uri="{FF2B5EF4-FFF2-40B4-BE49-F238E27FC236}">
-                <a16:creationId xmlns:a16="http://schemas.microsoft.com/office/drawing/2014/main" id="{EA1E8947-2712-44A4-9ABD-4564FA3C5491}"/>
-              </a:ext>
-            </a:extLst>
-          </p:cNvPr>
-          <p:cNvSpPr/>
-          <p:nvPr/>
-        </p:nvSpPr>
-        <p:spPr>
-          <a:xfrm flipH="1">
-            <a:off x="6580084" y="1009549"/>
-            <a:ext cx="1513168" cy="1028895"/>
-          </a:xfrm>
-          <a:prstGeom prst="flowChartMultidocument">
-            <a:avLst/>
-          </a:prstGeom>
-        </p:spPr>
-        <p:style>
-          <a:lnRef idx="2">
-            <a:schemeClr val="accent2">
-              <a:shade val="50000"/>
-            </a:schemeClr>
-          </a:lnRef>
-          <a:fillRef idx="1">
-            <a:schemeClr val="accent2"/>
-          </a:fillRef>
-          <a:effectRef idx="0">
-            <a:schemeClr val="accent2"/>
-          </a:effectRef>
-          <a:fontRef idx="minor">
-            <a:schemeClr val="lt1"/>
-          </a:fontRef>
-        </p:style>
-        <p:txBody>
-          <a:bodyPr rtlCol="0" anchor="ctr"/>
-          <a:lstStyle/>
-          <a:p>
-            <a:pPr algn="ctr"/>
-            <a:r>
-              <a:rPr lang="en-GB" sz="1600" dirty="0"/>
-              <a:t>Asset event distributions</a:t>
-            </a:r>
-          </a:p>
-        </p:txBody>
-      </p:sp>
       <p:sp>
         <p:nvSpPr>
           <p:cNvPr id="23" name="Flowchart: Magnetic Disk 22">
@@ -4167,55 +4120,6 @@
             <a:r>
               <a:rPr lang="en-GB" dirty="0"/>
               <a:t>Portfolio</a:t>
-            </a:r>
-          </a:p>
-        </p:txBody>
-      </p:sp>
-      <p:sp>
-        <p:nvSpPr>
-          <p:cNvPr id="28" name="Flowchart: Alternate Process 27">
-            <a:extLst>
-              <a:ext uri="{FF2B5EF4-FFF2-40B4-BE49-F238E27FC236}">
-                <a16:creationId xmlns:a16="http://schemas.microsoft.com/office/drawing/2014/main" id="{31171DAB-CB95-406D-83B8-8A1181FE3A36}"/>
-              </a:ext>
-            </a:extLst>
-          </p:cNvPr>
-          <p:cNvSpPr/>
-          <p:nvPr/>
-        </p:nvSpPr>
-        <p:spPr>
-          <a:xfrm>
-            <a:off x="8533825" y="1845009"/>
-            <a:ext cx="1451284" cy="673036"/>
-          </a:xfrm>
-          <a:prstGeom prst="flowChartAlternateProcess">
-            <a:avLst/>
-          </a:prstGeom>
-        </p:spPr>
-        <p:style>
-          <a:lnRef idx="2">
-            <a:schemeClr val="accent6">
-              <a:shade val="50000"/>
-            </a:schemeClr>
-          </a:lnRef>
-          <a:fillRef idx="1">
-            <a:schemeClr val="accent6"/>
-          </a:fillRef>
-          <a:effectRef idx="0">
-            <a:schemeClr val="accent6"/>
-          </a:effectRef>
-          <a:fontRef idx="minor">
-            <a:schemeClr val="lt1"/>
-          </a:fontRef>
-        </p:style>
-        <p:txBody>
-          <a:bodyPr rtlCol="0" anchor="ctr"/>
-          <a:lstStyle/>
-          <a:p>
-            <a:pPr algn="ctr"/>
-            <a:r>
-              <a:rPr lang="en-GB" dirty="0"/>
-              <a:t>Asset impact model</a:t>
             </a:r>
           </a:p>
         </p:txBody>
@@ -4421,8 +4325,8 @@
         </p:nvCxnSpPr>
         <p:spPr>
           <a:xfrm>
-            <a:off x="1584735" y="2663942"/>
-            <a:ext cx="2795987" cy="170152"/>
+            <a:off x="1573616" y="2684765"/>
+            <a:ext cx="6227757" cy="102932"/>
           </a:xfrm>
           <a:prstGeom prst="bentConnector3">
             <a:avLst>
@@ -4459,13 +4363,14 @@
           </p:cNvPr>
           <p:cNvCxnSpPr>
             <a:cxnSpLocks/>
+            <a:stCxn id="47" idx="3"/>
           </p:cNvCxnSpPr>
           <p:nvPr/>
         </p:nvCxnSpPr>
         <p:spPr>
-          <a:xfrm flipV="1">
-            <a:off x="1582465" y="2936995"/>
-            <a:ext cx="2789408" cy="61530"/>
+          <a:xfrm>
+            <a:off x="1573616" y="2822404"/>
+            <a:ext cx="6219051" cy="116878"/>
           </a:xfrm>
           <a:prstGeom prst="bentConnector3">
             <a:avLst>
@@ -4505,7 +4410,7 @@
         </p:nvSpPr>
         <p:spPr>
           <a:xfrm>
-            <a:off x="2182139" y="3058606"/>
+            <a:off x="2550339" y="2798930"/>
             <a:ext cx="1675630" cy="461665"/>
           </a:xfrm>
           <a:prstGeom prst="rect">
@@ -4556,7 +4461,7 @@
         </p:nvSpPr>
         <p:spPr>
           <a:xfrm>
-            <a:off x="1904134" y="2373042"/>
+            <a:off x="2579517" y="2421616"/>
             <a:ext cx="1675630" cy="276999"/>
           </a:xfrm>
           <a:prstGeom prst="rect">
@@ -4592,108 +4497,23 @@
       </p:sp>
       <p:cxnSp>
         <p:nvCxnSpPr>
-          <p:cNvPr id="61" name="Connector: Elbow 60">
-            <a:extLst>
-              <a:ext uri="{FF2B5EF4-FFF2-40B4-BE49-F238E27FC236}">
-                <a16:creationId xmlns:a16="http://schemas.microsoft.com/office/drawing/2014/main" id="{FF205D48-01DB-49CA-A2E5-1351FCC1930C}"/>
+          <p:cNvPr id="70" name="Straight Arrow Connector 69">
+            <a:extLst>
+              <a:ext uri="{FF2B5EF4-FFF2-40B4-BE49-F238E27FC236}">
+                <a16:creationId xmlns:a16="http://schemas.microsoft.com/office/drawing/2014/main" id="{B2A1E180-9020-43FB-98C7-C82DB605DB62}"/>
               </a:ext>
             </a:extLst>
           </p:cNvPr>
           <p:cNvCxnSpPr>
             <a:cxnSpLocks/>
-            <a:endCxn id="20" idx="3"/>
-          </p:cNvCxnSpPr>
-          <p:nvPr/>
-        </p:nvCxnSpPr>
-        <p:spPr>
-          <a:xfrm rot="5400000" flipH="1" flipV="1">
-            <a:off x="5557693" y="1976134"/>
-            <a:ext cx="1474527" cy="570255"/>
-          </a:xfrm>
-          <a:prstGeom prst="bentConnector2">
-            <a:avLst/>
-          </a:prstGeom>
-          <a:ln>
-            <a:tailEnd type="triangle"/>
-          </a:ln>
-        </p:spPr>
-        <p:style>
-          <a:lnRef idx="1">
-            <a:schemeClr val="accent1"/>
-          </a:lnRef>
-          <a:fillRef idx="0">
-            <a:schemeClr val="accent1"/>
-          </a:fillRef>
-          <a:effectRef idx="0">
-            <a:schemeClr val="accent1"/>
-          </a:effectRef>
-          <a:fontRef idx="minor">
-            <a:schemeClr val="tx1"/>
-          </a:fontRef>
-        </p:style>
-      </p:cxnSp>
-      <p:cxnSp>
-        <p:nvCxnSpPr>
-          <p:cNvPr id="67" name="Connector: Elbow 66">
-            <a:extLst>
-              <a:ext uri="{FF2B5EF4-FFF2-40B4-BE49-F238E27FC236}">
-                <a16:creationId xmlns:a16="http://schemas.microsoft.com/office/drawing/2014/main" id="{63548956-BCBD-4012-A783-349736B740F2}"/>
-              </a:ext>
-            </a:extLst>
-          </p:cNvPr>
-          <p:cNvCxnSpPr>
-            <a:cxnSpLocks/>
-            <a:endCxn id="5" idx="3"/>
-          </p:cNvCxnSpPr>
-          <p:nvPr/>
-        </p:nvCxnSpPr>
-        <p:spPr>
-          <a:xfrm flipV="1">
-            <a:off x="6009827" y="3071208"/>
-            <a:ext cx="570257" cy="39098"/>
-          </a:xfrm>
-          <a:prstGeom prst="bentConnector3">
-            <a:avLst>
-              <a:gd name="adj1" fmla="val 50000"/>
-            </a:avLst>
-          </a:prstGeom>
-          <a:ln>
-            <a:tailEnd type="triangle"/>
-          </a:ln>
-        </p:spPr>
-        <p:style>
-          <a:lnRef idx="1">
-            <a:schemeClr val="accent1"/>
-          </a:lnRef>
-          <a:fillRef idx="0">
-            <a:schemeClr val="accent1"/>
-          </a:fillRef>
-          <a:effectRef idx="0">
-            <a:schemeClr val="accent1"/>
-          </a:effectRef>
-          <a:fontRef idx="minor">
-            <a:schemeClr val="tx1"/>
-          </a:fontRef>
-        </p:style>
-      </p:cxnSp>
-      <p:cxnSp>
-        <p:nvCxnSpPr>
-          <p:cNvPr id="70" name="Straight Arrow Connector 69">
-            <a:extLst>
-              <a:ext uri="{FF2B5EF4-FFF2-40B4-BE49-F238E27FC236}">
-                <a16:creationId xmlns:a16="http://schemas.microsoft.com/office/drawing/2014/main" id="{B2A1E180-9020-43FB-98C7-C82DB605DB62}"/>
-              </a:ext>
-            </a:extLst>
-          </p:cNvPr>
-          <p:cNvCxnSpPr>
-            <a:stCxn id="23" idx="3"/>
+            <a:stCxn id="7" idx="4"/>
           </p:cNvCxnSpPr>
           <p:nvPr/>
         </p:nvCxnSpPr>
         <p:spPr>
           <a:xfrm>
-            <a:off x="4874095" y="1845009"/>
-            <a:ext cx="0" cy="627037"/>
+            <a:off x="5834525" y="1692609"/>
+            <a:ext cx="565624" cy="0"/>
           </a:xfrm>
           <a:prstGeom prst="straightConnector1">
             <a:avLst/>
@@ -4735,95 +4555,9 @@
         <p:spPr>
           <a:xfrm>
             <a:off x="3762032" y="1523997"/>
-            <a:ext cx="480104" cy="0"/>
+            <a:ext cx="456433" cy="0"/>
           </a:xfrm>
           <a:prstGeom prst="straightConnector1">
-            <a:avLst/>
-          </a:prstGeom>
-          <a:ln>
-            <a:tailEnd type="triangle"/>
-          </a:ln>
-        </p:spPr>
-        <p:style>
-          <a:lnRef idx="1">
-            <a:schemeClr val="accent1"/>
-          </a:lnRef>
-          <a:fillRef idx="0">
-            <a:schemeClr val="accent1"/>
-          </a:fillRef>
-          <a:effectRef idx="0">
-            <a:schemeClr val="accent1"/>
-          </a:effectRef>
-          <a:fontRef idx="minor">
-            <a:schemeClr val="tx1"/>
-          </a:fontRef>
-        </p:style>
-      </p:cxnSp>
-      <p:cxnSp>
-        <p:nvCxnSpPr>
-          <p:cNvPr id="77" name="Connector: Elbow 76">
-            <a:extLst>
-              <a:ext uri="{FF2B5EF4-FFF2-40B4-BE49-F238E27FC236}">
-                <a16:creationId xmlns:a16="http://schemas.microsoft.com/office/drawing/2014/main" id="{C1EA913A-2541-4A36-A4E8-D8ABF59098B9}"/>
-              </a:ext>
-            </a:extLst>
-          </p:cNvPr>
-          <p:cNvCxnSpPr>
-            <a:cxnSpLocks/>
-            <a:stCxn id="20" idx="1"/>
-            <a:endCxn id="28" idx="0"/>
-          </p:cNvCxnSpPr>
-          <p:nvPr/>
-        </p:nvCxnSpPr>
-        <p:spPr>
-          <a:xfrm>
-            <a:off x="8093252" y="1523997"/>
-            <a:ext cx="1166215" cy="321012"/>
-          </a:xfrm>
-          <a:prstGeom prst="bentConnector2">
-            <a:avLst/>
-          </a:prstGeom>
-          <a:ln>
-            <a:tailEnd type="triangle"/>
-          </a:ln>
-        </p:spPr>
-        <p:style>
-          <a:lnRef idx="1">
-            <a:schemeClr val="accent1"/>
-          </a:lnRef>
-          <a:fillRef idx="0">
-            <a:schemeClr val="accent1"/>
-          </a:fillRef>
-          <a:effectRef idx="0">
-            <a:schemeClr val="accent1"/>
-          </a:effectRef>
-          <a:fontRef idx="minor">
-            <a:schemeClr val="tx1"/>
-          </a:fontRef>
-        </p:style>
-      </p:cxnSp>
-      <p:cxnSp>
-        <p:nvCxnSpPr>
-          <p:cNvPr id="80" name="Connector: Elbow 79">
-            <a:extLst>
-              <a:ext uri="{FF2B5EF4-FFF2-40B4-BE49-F238E27FC236}">
-                <a16:creationId xmlns:a16="http://schemas.microsoft.com/office/drawing/2014/main" id="{F3A6CB87-181D-4978-8FED-6265985B019F}"/>
-              </a:ext>
-            </a:extLst>
-          </p:cNvPr>
-          <p:cNvCxnSpPr>
-            <a:cxnSpLocks/>
-            <a:stCxn id="5" idx="1"/>
-            <a:endCxn id="28" idx="2"/>
-          </p:cNvCxnSpPr>
-          <p:nvPr/>
-        </p:nvCxnSpPr>
-        <p:spPr>
-          <a:xfrm flipV="1">
-            <a:off x="8093252" y="2518045"/>
-            <a:ext cx="1166215" cy="553163"/>
-          </a:xfrm>
-          <a:prstGeom prst="bentConnector2">
             <a:avLst/>
           </a:prstGeom>
           <a:ln>
@@ -4890,49 +4624,6 @@
       </p:cxnSp>
       <p:cxnSp>
         <p:nvCxnSpPr>
-          <p:cNvPr id="88" name="Straight Arrow Connector 87">
-            <a:extLst>
-              <a:ext uri="{FF2B5EF4-FFF2-40B4-BE49-F238E27FC236}">
-                <a16:creationId xmlns:a16="http://schemas.microsoft.com/office/drawing/2014/main" id="{14CD7417-4503-4974-A49C-5B18EF6BA44B}"/>
-              </a:ext>
-            </a:extLst>
-          </p:cNvPr>
-          <p:cNvCxnSpPr>
-            <a:cxnSpLocks/>
-            <a:stCxn id="28" idx="3"/>
-            <a:endCxn id="29" idx="1"/>
-          </p:cNvCxnSpPr>
-          <p:nvPr/>
-        </p:nvCxnSpPr>
-        <p:spPr>
-          <a:xfrm>
-            <a:off x="9985109" y="2181527"/>
-            <a:ext cx="341240" cy="0"/>
-          </a:xfrm>
-          <a:prstGeom prst="straightConnector1">
-            <a:avLst/>
-          </a:prstGeom>
-          <a:ln>
-            <a:tailEnd type="triangle"/>
-          </a:ln>
-        </p:spPr>
-        <p:style>
-          <a:lnRef idx="1">
-            <a:schemeClr val="accent1"/>
-          </a:lnRef>
-          <a:fillRef idx="0">
-            <a:schemeClr val="accent1"/>
-          </a:fillRef>
-          <a:effectRef idx="0">
-            <a:schemeClr val="accent1"/>
-          </a:effectRef>
-          <a:fontRef idx="minor">
-            <a:schemeClr val="tx1"/>
-          </a:fontRef>
-        </p:style>
-      </p:cxnSp>
-      <p:cxnSp>
-        <p:nvCxnSpPr>
           <p:cNvPr id="95" name="Straight Arrow Connector 94">
             <a:extLst>
               <a:ext uri="{FF2B5EF4-FFF2-40B4-BE49-F238E27FC236}">
@@ -5023,7 +4714,7 @@
                   </a:outerShdw>
                 </a:effectLst>
               </a:rPr>
-              <a:t>Asset impact distributions</a:t>
+              <a:t>Impact distributions</a:t>
             </a:r>
             <a:endParaRPr lang="en-GB" sz="1200" dirty="0"/>
           </a:p>
@@ -5045,8 +4736,8 @@
         </p:nvCxnSpPr>
         <p:spPr>
           <a:xfrm>
-            <a:off x="1180481" y="3073331"/>
-            <a:ext cx="1358488" cy="758627"/>
+            <a:off x="1562290" y="2940097"/>
+            <a:ext cx="976679" cy="891861"/>
           </a:xfrm>
           <a:prstGeom prst="bentConnector3">
             <a:avLst/>
@@ -5127,6 +4818,1057 @@
           </a:p>
         </p:txBody>
       </p:sp>
+      <p:sp>
+        <p:nvSpPr>
+          <p:cNvPr id="2" name="Flowchart: Magnetic Disk 22">
+            <a:extLst>
+              <a:ext uri="{FF2B5EF4-FFF2-40B4-BE49-F238E27FC236}">
+                <a16:creationId xmlns:a16="http://schemas.microsoft.com/office/drawing/2014/main" id="{AC0A926A-E1F6-7E7A-C08B-889E086B7B17}"/>
+              </a:ext>
+            </a:extLst>
+          </p:cNvPr>
+          <p:cNvSpPr/>
+          <p:nvPr/>
+        </p:nvSpPr>
+        <p:spPr>
+          <a:xfrm>
+            <a:off x="4370865" y="1083009"/>
+            <a:ext cx="1311260" cy="914400"/>
+          </a:xfrm>
+          <a:prstGeom prst="flowChartMagneticDisk">
+            <a:avLst/>
+          </a:prstGeom>
+        </p:spPr>
+        <p:style>
+          <a:lnRef idx="2">
+            <a:schemeClr val="accent2">
+              <a:shade val="50000"/>
+            </a:schemeClr>
+          </a:lnRef>
+          <a:fillRef idx="1">
+            <a:schemeClr val="accent2"/>
+          </a:fillRef>
+          <a:effectRef idx="0">
+            <a:schemeClr val="accent2"/>
+          </a:effectRef>
+          <a:fontRef idx="minor">
+            <a:schemeClr val="lt1"/>
+          </a:fontRef>
+        </p:style>
+        <p:txBody>
+          <a:bodyPr rtlCol="0" anchor="ctr"/>
+          <a:lstStyle/>
+          <a:p>
+            <a:pPr algn="ctr"/>
+            <a:r>
+              <a:rPr lang="en-GB" sz="1600" dirty="0"/>
+              <a:t>Hazard data sets</a:t>
+            </a:r>
+          </a:p>
+        </p:txBody>
+      </p:sp>
+      <p:sp>
+        <p:nvSpPr>
+          <p:cNvPr id="7" name="Flowchart: Magnetic Disk 22">
+            <a:extLst>
+              <a:ext uri="{FF2B5EF4-FFF2-40B4-BE49-F238E27FC236}">
+                <a16:creationId xmlns:a16="http://schemas.microsoft.com/office/drawing/2014/main" id="{3D5D27EF-F6AB-B61A-CC91-6E8287A05EFB}"/>
+              </a:ext>
+            </a:extLst>
+          </p:cNvPr>
+          <p:cNvSpPr/>
+          <p:nvPr/>
+        </p:nvSpPr>
+        <p:spPr>
+          <a:xfrm>
+            <a:off x="4523265" y="1235409"/>
+            <a:ext cx="1311260" cy="914400"/>
+          </a:xfrm>
+          <a:prstGeom prst="flowChartMagneticDisk">
+            <a:avLst/>
+          </a:prstGeom>
+        </p:spPr>
+        <p:style>
+          <a:lnRef idx="2">
+            <a:schemeClr val="accent2">
+              <a:shade val="50000"/>
+            </a:schemeClr>
+          </a:lnRef>
+          <a:fillRef idx="1">
+            <a:schemeClr val="accent2"/>
+          </a:fillRef>
+          <a:effectRef idx="0">
+            <a:schemeClr val="accent2"/>
+          </a:effectRef>
+          <a:fontRef idx="minor">
+            <a:schemeClr val="lt1"/>
+          </a:fontRef>
+        </p:style>
+        <p:txBody>
+          <a:bodyPr rtlCol="0" anchor="ctr"/>
+          <a:lstStyle/>
+          <a:p>
+            <a:pPr algn="ctr"/>
+            <a:r>
+              <a:rPr lang="en-GB" sz="1600" dirty="0"/>
+              <a:t>Hazard indicator data sets</a:t>
+            </a:r>
+          </a:p>
+        </p:txBody>
+      </p:sp>
+      <p:grpSp>
+        <p:nvGrpSpPr>
+          <p:cNvPr id="32" name="Group 31">
+            <a:extLst>
+              <a:ext uri="{FF2B5EF4-FFF2-40B4-BE49-F238E27FC236}">
+                <a16:creationId xmlns:a16="http://schemas.microsoft.com/office/drawing/2014/main" id="{C4C46B35-D50F-269E-34BA-E1A5AC6DB0E3}"/>
+              </a:ext>
+            </a:extLst>
+          </p:cNvPr>
+          <p:cNvGrpSpPr/>
+          <p:nvPr/>
+        </p:nvGrpSpPr>
+        <p:grpSpPr>
+          <a:xfrm>
+            <a:off x="6405521" y="1177764"/>
+            <a:ext cx="1616060" cy="1028895"/>
+            <a:chOff x="3687769" y="3917530"/>
+            <a:chExt cx="1616060" cy="1028895"/>
+          </a:xfrm>
+          <a:solidFill>
+            <a:schemeClr val="accent2"/>
+          </a:solidFill>
+        </p:grpSpPr>
+        <p:sp>
+          <p:nvSpPr>
+            <p:cNvPr id="33" name="Flowchart: Alternate Process 13">
+              <a:extLst>
+                <a:ext uri="{FF2B5EF4-FFF2-40B4-BE49-F238E27FC236}">
+                  <a16:creationId xmlns:a16="http://schemas.microsoft.com/office/drawing/2014/main" id="{4B6B978B-B8E8-C4D3-C3DD-41C3C1F0E284}"/>
+                </a:ext>
+              </a:extLst>
+            </p:cNvPr>
+            <p:cNvSpPr/>
+            <p:nvPr/>
+          </p:nvSpPr>
+          <p:spPr>
+            <a:xfrm>
+              <a:off x="3687769" y="3917530"/>
+              <a:ext cx="1311260" cy="724095"/>
+            </a:xfrm>
+            <a:prstGeom prst="flowChartAlternateProcess">
+              <a:avLst/>
+            </a:prstGeom>
+            <a:grpFill/>
+            <a:ln>
+              <a:solidFill>
+                <a:schemeClr val="accent2">
+                  <a:lumMod val="75000"/>
+                </a:schemeClr>
+              </a:solidFill>
+            </a:ln>
+          </p:spPr>
+          <p:style>
+            <a:lnRef idx="2">
+              <a:schemeClr val="accent6">
+                <a:shade val="50000"/>
+              </a:schemeClr>
+            </a:lnRef>
+            <a:fillRef idx="1">
+              <a:schemeClr val="accent6"/>
+            </a:fillRef>
+            <a:effectRef idx="0">
+              <a:schemeClr val="accent6"/>
+            </a:effectRef>
+            <a:fontRef idx="minor">
+              <a:schemeClr val="lt1"/>
+            </a:fontRef>
+          </p:style>
+          <p:txBody>
+            <a:bodyPr rtlCol="0" anchor="ctr"/>
+            <a:lstStyle/>
+            <a:p>
+              <a:pPr algn="ctr"/>
+              <a:endParaRPr lang="en-GB" sz="1600" dirty="0"/>
+            </a:p>
+          </p:txBody>
+        </p:sp>
+        <p:sp>
+          <p:nvSpPr>
+            <p:cNvPr id="34" name="Flowchart: Alternate Process 14">
+              <a:extLst>
+                <a:ext uri="{FF2B5EF4-FFF2-40B4-BE49-F238E27FC236}">
+                  <a16:creationId xmlns:a16="http://schemas.microsoft.com/office/drawing/2014/main" id="{7A886CA2-140A-7FFE-A9BD-C65EF7D28964}"/>
+                </a:ext>
+              </a:extLst>
+            </p:cNvPr>
+            <p:cNvSpPr/>
+            <p:nvPr/>
+          </p:nvSpPr>
+          <p:spPr>
+            <a:xfrm>
+              <a:off x="3840169" y="4069930"/>
+              <a:ext cx="1311260" cy="724095"/>
+            </a:xfrm>
+            <a:prstGeom prst="flowChartAlternateProcess">
+              <a:avLst/>
+            </a:prstGeom>
+            <a:grpFill/>
+            <a:ln>
+              <a:solidFill>
+                <a:schemeClr val="accent2">
+                  <a:lumMod val="75000"/>
+                </a:schemeClr>
+              </a:solidFill>
+            </a:ln>
+          </p:spPr>
+          <p:style>
+            <a:lnRef idx="2">
+              <a:schemeClr val="accent6">
+                <a:shade val="50000"/>
+              </a:schemeClr>
+            </a:lnRef>
+            <a:fillRef idx="1">
+              <a:schemeClr val="accent6"/>
+            </a:fillRef>
+            <a:effectRef idx="0">
+              <a:schemeClr val="accent6"/>
+            </a:effectRef>
+            <a:fontRef idx="minor">
+              <a:schemeClr val="lt1"/>
+            </a:fontRef>
+          </p:style>
+          <p:txBody>
+            <a:bodyPr rtlCol="0" anchor="ctr"/>
+            <a:lstStyle/>
+            <a:p>
+              <a:pPr algn="ctr"/>
+              <a:endParaRPr lang="en-GB" sz="1600" dirty="0"/>
+            </a:p>
+          </p:txBody>
+        </p:sp>
+        <p:sp>
+          <p:nvSpPr>
+            <p:cNvPr id="35" name="Flowchart: Alternate Process 15">
+              <a:extLst>
+                <a:ext uri="{FF2B5EF4-FFF2-40B4-BE49-F238E27FC236}">
+                  <a16:creationId xmlns:a16="http://schemas.microsoft.com/office/drawing/2014/main" id="{ECD15FCA-D69A-FABF-70BC-29E0A8ECEEA3}"/>
+                </a:ext>
+              </a:extLst>
+            </p:cNvPr>
+            <p:cNvSpPr/>
+            <p:nvPr/>
+          </p:nvSpPr>
+          <p:spPr>
+            <a:xfrm>
+              <a:off x="3992569" y="4222330"/>
+              <a:ext cx="1311260" cy="724095"/>
+            </a:xfrm>
+            <a:prstGeom prst="flowChartAlternateProcess">
+              <a:avLst/>
+            </a:prstGeom>
+            <a:grpFill/>
+            <a:ln>
+              <a:solidFill>
+                <a:schemeClr val="accent2">
+                  <a:lumMod val="75000"/>
+                </a:schemeClr>
+              </a:solidFill>
+            </a:ln>
+          </p:spPr>
+          <p:style>
+            <a:lnRef idx="2">
+              <a:schemeClr val="accent6">
+                <a:shade val="50000"/>
+              </a:schemeClr>
+            </a:lnRef>
+            <a:fillRef idx="1">
+              <a:schemeClr val="accent6"/>
+            </a:fillRef>
+            <a:effectRef idx="0">
+              <a:schemeClr val="accent6"/>
+            </a:effectRef>
+            <a:fontRef idx="minor">
+              <a:schemeClr val="lt1"/>
+            </a:fontRef>
+          </p:style>
+          <p:txBody>
+            <a:bodyPr rtlCol="0" anchor="ctr"/>
+            <a:lstStyle/>
+            <a:p>
+              <a:pPr algn="ctr"/>
+              <a:r>
+                <a:rPr lang="en-GB" sz="1600" dirty="0"/>
+                <a:t>Hazard models</a:t>
+              </a:r>
+            </a:p>
+          </p:txBody>
+        </p:sp>
+      </p:grpSp>
+      <p:cxnSp>
+        <p:nvCxnSpPr>
+          <p:cNvPr id="51" name="Straight Connector 50">
+            <a:extLst>
+              <a:ext uri="{FF2B5EF4-FFF2-40B4-BE49-F238E27FC236}">
+                <a16:creationId xmlns:a16="http://schemas.microsoft.com/office/drawing/2014/main" id="{B5FD2161-3349-4C9C-0929-70FC54FEDEF5}"/>
+              </a:ext>
+            </a:extLst>
+          </p:cNvPr>
+          <p:cNvCxnSpPr>
+            <a:cxnSpLocks/>
+          </p:cNvCxnSpPr>
+          <p:nvPr/>
+        </p:nvCxnSpPr>
+        <p:spPr>
+          <a:xfrm>
+            <a:off x="6102305" y="309716"/>
+            <a:ext cx="5592" cy="4094940"/>
+          </a:xfrm>
+          <a:prstGeom prst="line">
+            <a:avLst/>
+          </a:prstGeom>
+          <a:ln w="15875">
+            <a:prstDash val="lgDash"/>
+          </a:ln>
+        </p:spPr>
+        <p:style>
+          <a:lnRef idx="1">
+            <a:schemeClr val="accent1"/>
+          </a:lnRef>
+          <a:fillRef idx="0">
+            <a:schemeClr val="accent1"/>
+          </a:fillRef>
+          <a:effectRef idx="0">
+            <a:schemeClr val="accent1"/>
+          </a:effectRef>
+          <a:fontRef idx="minor">
+            <a:schemeClr val="tx1"/>
+          </a:fontRef>
+        </p:style>
+      </p:cxnSp>
+      <p:cxnSp>
+        <p:nvCxnSpPr>
+          <p:cNvPr id="79" name="Connector: Elbow 49">
+            <a:extLst>
+              <a:ext uri="{FF2B5EF4-FFF2-40B4-BE49-F238E27FC236}">
+                <a16:creationId xmlns:a16="http://schemas.microsoft.com/office/drawing/2014/main" id="{FFED0667-59A2-AC7A-EBC0-8D42EF65A4F1}"/>
+              </a:ext>
+            </a:extLst>
+          </p:cNvPr>
+          <p:cNvCxnSpPr>
+            <a:cxnSpLocks/>
+            <a:stCxn id="16" idx="3"/>
+            <a:endCxn id="29" idx="1"/>
+          </p:cNvCxnSpPr>
+          <p:nvPr/>
+        </p:nvCxnSpPr>
+        <p:spPr>
+          <a:xfrm flipV="1">
+            <a:off x="9417433" y="2181527"/>
+            <a:ext cx="908916" cy="910970"/>
+          </a:xfrm>
+          <a:prstGeom prst="bentConnector3">
+            <a:avLst>
+              <a:gd name="adj1" fmla="val 50000"/>
+            </a:avLst>
+          </a:prstGeom>
+          <a:ln>
+            <a:tailEnd type="triangle"/>
+          </a:ln>
+        </p:spPr>
+        <p:style>
+          <a:lnRef idx="1">
+            <a:schemeClr val="accent1"/>
+          </a:lnRef>
+          <a:fillRef idx="0">
+            <a:schemeClr val="accent1"/>
+          </a:fillRef>
+          <a:effectRef idx="0">
+            <a:schemeClr val="accent1"/>
+          </a:effectRef>
+          <a:fontRef idx="minor">
+            <a:schemeClr val="tx1"/>
+          </a:fontRef>
+        </p:style>
+      </p:cxnSp>
+      <p:cxnSp>
+        <p:nvCxnSpPr>
+          <p:cNvPr id="89" name="Connector: Elbow 49">
+            <a:extLst>
+              <a:ext uri="{FF2B5EF4-FFF2-40B4-BE49-F238E27FC236}">
+                <a16:creationId xmlns:a16="http://schemas.microsoft.com/office/drawing/2014/main" id="{C41EC228-D496-DC6D-069F-EB410EF8F380}"/>
+              </a:ext>
+            </a:extLst>
+          </p:cNvPr>
+          <p:cNvCxnSpPr>
+            <a:cxnSpLocks/>
+            <a:stCxn id="35" idx="2"/>
+          </p:cNvCxnSpPr>
+          <p:nvPr/>
+        </p:nvCxnSpPr>
+        <p:spPr>
+          <a:xfrm rot="16200000" flipH="1">
+            <a:off x="7375770" y="2196840"/>
+            <a:ext cx="415784" cy="435422"/>
+          </a:xfrm>
+          <a:prstGeom prst="bentConnector2">
+            <a:avLst/>
+          </a:prstGeom>
+          <a:ln>
+            <a:tailEnd type="triangle"/>
+          </a:ln>
+        </p:spPr>
+        <p:style>
+          <a:lnRef idx="1">
+            <a:schemeClr val="accent1"/>
+          </a:lnRef>
+          <a:fillRef idx="0">
+            <a:schemeClr val="accent1"/>
+          </a:fillRef>
+          <a:effectRef idx="0">
+            <a:schemeClr val="accent1"/>
+          </a:effectRef>
+          <a:fontRef idx="minor">
+            <a:schemeClr val="tx1"/>
+          </a:fontRef>
+        </p:style>
+      </p:cxnSp>
+      <p:grpSp>
+        <p:nvGrpSpPr>
+          <p:cNvPr id="134" name="Group 133">
+            <a:extLst>
+              <a:ext uri="{FF2B5EF4-FFF2-40B4-BE49-F238E27FC236}">
+                <a16:creationId xmlns:a16="http://schemas.microsoft.com/office/drawing/2014/main" id="{CB7EBA0E-97C9-BB6D-8BAF-A7F067D194A9}"/>
+              </a:ext>
+            </a:extLst>
+          </p:cNvPr>
+          <p:cNvGrpSpPr/>
+          <p:nvPr/>
+        </p:nvGrpSpPr>
+        <p:grpSpPr>
+          <a:xfrm>
+            <a:off x="3084621" y="4771364"/>
+            <a:ext cx="5432407" cy="1635990"/>
+            <a:chOff x="3208145" y="4716042"/>
+            <a:chExt cx="6521057" cy="2044938"/>
+          </a:xfrm>
+        </p:grpSpPr>
+        <p:cxnSp>
+          <p:nvCxnSpPr>
+            <p:cNvPr id="77" name="Connector: Elbow 76">
+              <a:extLst>
+                <a:ext uri="{FF2B5EF4-FFF2-40B4-BE49-F238E27FC236}">
+                  <a16:creationId xmlns:a16="http://schemas.microsoft.com/office/drawing/2014/main" id="{C1EA913A-2541-4A36-A4E8-D8ABF59098B9}"/>
+                </a:ext>
+              </a:extLst>
+            </p:cNvPr>
+            <p:cNvCxnSpPr>
+              <a:cxnSpLocks/>
+              <a:stCxn id="121" idx="3"/>
+              <a:endCxn id="85" idx="0"/>
+            </p:cNvCxnSpPr>
+            <p:nvPr/>
+          </p:nvCxnSpPr>
+          <p:spPr>
+            <a:xfrm>
+              <a:off x="6400149" y="5106944"/>
+              <a:ext cx="895220" cy="249666"/>
+            </a:xfrm>
+            <a:prstGeom prst="bentConnector2">
+              <a:avLst/>
+            </a:prstGeom>
+            <a:ln>
+              <a:tailEnd type="triangle"/>
+            </a:ln>
+          </p:spPr>
+          <p:style>
+            <a:lnRef idx="1">
+              <a:schemeClr val="accent1"/>
+            </a:lnRef>
+            <a:fillRef idx="0">
+              <a:schemeClr val="accent1"/>
+            </a:fillRef>
+            <a:effectRef idx="0">
+              <a:schemeClr val="accent1"/>
+            </a:effectRef>
+            <a:fontRef idx="minor">
+              <a:schemeClr val="tx1"/>
+            </a:fontRef>
+          </p:style>
+        </p:cxnSp>
+        <p:cxnSp>
+          <p:nvCxnSpPr>
+            <p:cNvPr id="80" name="Connector: Elbow 79">
+              <a:extLst>
+                <a:ext uri="{FF2B5EF4-FFF2-40B4-BE49-F238E27FC236}">
+                  <a16:creationId xmlns:a16="http://schemas.microsoft.com/office/drawing/2014/main" id="{F3A6CB87-181D-4978-8FED-6265985B019F}"/>
+                </a:ext>
+              </a:extLst>
+            </p:cNvPr>
+            <p:cNvCxnSpPr>
+              <a:cxnSpLocks/>
+              <a:endCxn id="85" idx="2"/>
+            </p:cNvCxnSpPr>
+            <p:nvPr/>
+          </p:nvCxnSpPr>
+          <p:spPr>
+            <a:xfrm flipV="1">
+              <a:off x="6455545" y="5979177"/>
+              <a:ext cx="839824" cy="347353"/>
+            </a:xfrm>
+            <a:prstGeom prst="bentConnector2">
+              <a:avLst/>
+            </a:prstGeom>
+            <a:ln>
+              <a:tailEnd type="triangle"/>
+            </a:ln>
+          </p:spPr>
+          <p:style>
+            <a:lnRef idx="1">
+              <a:schemeClr val="accent1"/>
+            </a:lnRef>
+            <a:fillRef idx="0">
+              <a:schemeClr val="accent1"/>
+            </a:fillRef>
+            <a:effectRef idx="0">
+              <a:schemeClr val="accent1"/>
+            </a:effectRef>
+            <a:fontRef idx="minor">
+              <a:schemeClr val="tx1"/>
+            </a:fontRef>
+          </p:style>
+        </p:cxnSp>
+        <p:sp>
+          <p:nvSpPr>
+            <p:cNvPr id="48" name="Document 47">
+              <a:extLst>
+                <a:ext uri="{FF2B5EF4-FFF2-40B4-BE49-F238E27FC236}">
+                  <a16:creationId xmlns:a16="http://schemas.microsoft.com/office/drawing/2014/main" id="{1F61EDC6-33E0-EE86-BDFC-2D8507274773}"/>
+                </a:ext>
+              </a:extLst>
+            </p:cNvPr>
+            <p:cNvSpPr/>
+            <p:nvPr/>
+          </p:nvSpPr>
+          <p:spPr>
+            <a:xfrm>
+              <a:off x="4996248" y="5979177"/>
+              <a:ext cx="1459297" cy="781803"/>
+            </a:xfrm>
+            <a:prstGeom prst="flowChartDocument">
+              <a:avLst/>
+            </a:prstGeom>
+            <a:solidFill>
+              <a:schemeClr val="accent6"/>
+            </a:solidFill>
+            <a:ln>
+              <a:solidFill>
+                <a:schemeClr val="accent6">
+                  <a:lumMod val="75000"/>
+                </a:schemeClr>
+              </a:solidFill>
+            </a:ln>
+          </p:spPr>
+          <p:style>
+            <a:lnRef idx="2">
+              <a:schemeClr val="accent1">
+                <a:shade val="50000"/>
+              </a:schemeClr>
+            </a:lnRef>
+            <a:fillRef idx="1">
+              <a:schemeClr val="accent1"/>
+            </a:fillRef>
+            <a:effectRef idx="0">
+              <a:schemeClr val="accent1"/>
+            </a:effectRef>
+            <a:fontRef idx="minor">
+              <a:schemeClr val="lt1"/>
+            </a:fontRef>
+          </p:style>
+          <p:txBody>
+            <a:bodyPr rtlCol="0" anchor="ctr"/>
+            <a:lstStyle/>
+            <a:p>
+              <a:pPr algn="ctr"/>
+              <a:r>
+                <a:rPr lang="en-US" sz="1200" dirty="0"/>
+                <a:t>Vulnerability distribution</a:t>
+              </a:r>
+            </a:p>
+          </p:txBody>
+        </p:sp>
+        <p:sp>
+          <p:nvSpPr>
+            <p:cNvPr id="78" name="Document 77">
+              <a:extLst>
+                <a:ext uri="{FF2B5EF4-FFF2-40B4-BE49-F238E27FC236}">
+                  <a16:creationId xmlns:a16="http://schemas.microsoft.com/office/drawing/2014/main" id="{FA5C77DD-0456-7A0B-47EE-84C7D38DFDAB}"/>
+                </a:ext>
+              </a:extLst>
+            </p:cNvPr>
+            <p:cNvSpPr/>
+            <p:nvPr/>
+          </p:nvSpPr>
+          <p:spPr>
+            <a:xfrm>
+              <a:off x="8269905" y="5276991"/>
+              <a:ext cx="1459297" cy="781803"/>
+            </a:xfrm>
+            <a:prstGeom prst="flowChartDocument">
+              <a:avLst/>
+            </a:prstGeom>
+            <a:solidFill>
+              <a:schemeClr val="accent6"/>
+            </a:solidFill>
+            <a:ln>
+              <a:solidFill>
+                <a:schemeClr val="accent6">
+                  <a:lumMod val="75000"/>
+                </a:schemeClr>
+              </a:solidFill>
+            </a:ln>
+          </p:spPr>
+          <p:style>
+            <a:lnRef idx="2">
+              <a:schemeClr val="accent1">
+                <a:shade val="50000"/>
+              </a:schemeClr>
+            </a:lnRef>
+            <a:fillRef idx="1">
+              <a:schemeClr val="accent1"/>
+            </a:fillRef>
+            <a:effectRef idx="0">
+              <a:schemeClr val="accent1"/>
+            </a:effectRef>
+            <a:fontRef idx="minor">
+              <a:schemeClr val="lt1"/>
+            </a:fontRef>
+          </p:style>
+          <p:txBody>
+            <a:bodyPr rtlCol="0" anchor="ctr"/>
+            <a:lstStyle/>
+            <a:p>
+              <a:pPr algn="ctr"/>
+              <a:r>
+                <a:rPr lang="en-US" sz="1200" dirty="0"/>
+                <a:t>Impact distribution </a:t>
+              </a:r>
+            </a:p>
+          </p:txBody>
+        </p:sp>
+        <p:sp>
+          <p:nvSpPr>
+            <p:cNvPr id="85" name="Flowchart: Alternate Process 15">
+              <a:extLst>
+                <a:ext uri="{FF2B5EF4-FFF2-40B4-BE49-F238E27FC236}">
+                  <a16:creationId xmlns:a16="http://schemas.microsoft.com/office/drawing/2014/main" id="{B430D7B9-EFB1-25A9-8D3B-F44FC21F0D19}"/>
+                </a:ext>
+              </a:extLst>
+            </p:cNvPr>
+            <p:cNvSpPr/>
+            <p:nvPr/>
+          </p:nvSpPr>
+          <p:spPr>
+            <a:xfrm>
+              <a:off x="6644058" y="5356610"/>
+              <a:ext cx="1302621" cy="622567"/>
+            </a:xfrm>
+            <a:prstGeom prst="flowChartAlternateProcess">
+              <a:avLst/>
+            </a:prstGeom>
+          </p:spPr>
+          <p:style>
+            <a:lnRef idx="2">
+              <a:schemeClr val="accent6">
+                <a:shade val="50000"/>
+              </a:schemeClr>
+            </a:lnRef>
+            <a:fillRef idx="1">
+              <a:schemeClr val="accent6"/>
+            </a:fillRef>
+            <a:effectRef idx="0">
+              <a:schemeClr val="accent6"/>
+            </a:effectRef>
+            <a:fontRef idx="minor">
+              <a:schemeClr val="lt1"/>
+            </a:fontRef>
+          </p:style>
+          <p:txBody>
+            <a:bodyPr rtlCol="0" anchor="ctr"/>
+            <a:lstStyle/>
+            <a:p>
+              <a:pPr algn="ctr"/>
+              <a:r>
+                <a:rPr lang="en-GB" sz="1200" dirty="0"/>
+                <a:t>Convolution</a:t>
+              </a:r>
+            </a:p>
+          </p:txBody>
+        </p:sp>
+        <p:cxnSp>
+          <p:nvCxnSpPr>
+            <p:cNvPr id="114" name="Connector: Elbow 49">
+              <a:extLst>
+                <a:ext uri="{FF2B5EF4-FFF2-40B4-BE49-F238E27FC236}">
+                  <a16:creationId xmlns:a16="http://schemas.microsoft.com/office/drawing/2014/main" id="{DE643D08-744F-E39E-D0A9-76B5DC332964}"/>
+                </a:ext>
+              </a:extLst>
+            </p:cNvPr>
+            <p:cNvCxnSpPr>
+              <a:cxnSpLocks/>
+              <a:stCxn id="85" idx="3"/>
+              <a:endCxn id="78" idx="1"/>
+            </p:cNvCxnSpPr>
+            <p:nvPr/>
+          </p:nvCxnSpPr>
+          <p:spPr>
+            <a:xfrm flipV="1">
+              <a:off x="7946679" y="5667893"/>
+              <a:ext cx="323226" cy="1"/>
+            </a:xfrm>
+            <a:prstGeom prst="bentConnector3">
+              <a:avLst>
+                <a:gd name="adj1" fmla="val 50000"/>
+              </a:avLst>
+            </a:prstGeom>
+            <a:ln>
+              <a:tailEnd type="triangle"/>
+            </a:ln>
+          </p:spPr>
+          <p:style>
+            <a:lnRef idx="1">
+              <a:schemeClr val="accent1"/>
+            </a:lnRef>
+            <a:fillRef idx="0">
+              <a:schemeClr val="accent1"/>
+            </a:fillRef>
+            <a:effectRef idx="0">
+              <a:schemeClr val="accent1"/>
+            </a:effectRef>
+            <a:fontRef idx="minor">
+              <a:schemeClr val="tx1"/>
+            </a:fontRef>
+          </p:style>
+        </p:cxnSp>
+        <p:sp>
+          <p:nvSpPr>
+            <p:cNvPr id="119" name="Flowchart: Alternate Process 15">
+              <a:extLst>
+                <a:ext uri="{FF2B5EF4-FFF2-40B4-BE49-F238E27FC236}">
+                  <a16:creationId xmlns:a16="http://schemas.microsoft.com/office/drawing/2014/main" id="{E8553924-28A9-26DD-C82A-5E21F6BC8C8B}"/>
+                </a:ext>
+              </a:extLst>
+            </p:cNvPr>
+            <p:cNvSpPr/>
+            <p:nvPr/>
+          </p:nvSpPr>
+          <p:spPr>
+            <a:xfrm>
+              <a:off x="3208145" y="5341432"/>
+              <a:ext cx="1302621" cy="622567"/>
+            </a:xfrm>
+            <a:prstGeom prst="flowChartAlternateProcess">
+              <a:avLst/>
+            </a:prstGeom>
+          </p:spPr>
+          <p:style>
+            <a:lnRef idx="2">
+              <a:schemeClr val="accent6">
+                <a:shade val="50000"/>
+              </a:schemeClr>
+            </a:lnRef>
+            <a:fillRef idx="1">
+              <a:schemeClr val="accent6"/>
+            </a:fillRef>
+            <a:effectRef idx="0">
+              <a:schemeClr val="accent6"/>
+            </a:effectRef>
+            <a:fontRef idx="minor">
+              <a:schemeClr val="lt1"/>
+            </a:fontRef>
+          </p:style>
+          <p:txBody>
+            <a:bodyPr rtlCol="0" anchor="ctr"/>
+            <a:lstStyle/>
+            <a:p>
+              <a:pPr algn="ctr"/>
+              <a:r>
+                <a:rPr lang="en-GB" sz="1200" dirty="0"/>
+                <a:t>Infer distributions</a:t>
+              </a:r>
+            </a:p>
+          </p:txBody>
+        </p:sp>
+        <p:sp>
+          <p:nvSpPr>
+            <p:cNvPr id="121" name="Document 120">
+              <a:extLst>
+                <a:ext uri="{FF2B5EF4-FFF2-40B4-BE49-F238E27FC236}">
+                  <a16:creationId xmlns:a16="http://schemas.microsoft.com/office/drawing/2014/main" id="{DD5F6C0F-A6AB-E8D7-7AB5-7CA973B7A8F1}"/>
+                </a:ext>
+              </a:extLst>
+            </p:cNvPr>
+            <p:cNvSpPr/>
+            <p:nvPr/>
+          </p:nvSpPr>
+          <p:spPr>
+            <a:xfrm>
+              <a:off x="4940852" y="4716042"/>
+              <a:ext cx="1459297" cy="781803"/>
+            </a:xfrm>
+            <a:prstGeom prst="flowChartDocument">
+              <a:avLst/>
+            </a:prstGeom>
+            <a:solidFill>
+              <a:schemeClr val="accent6"/>
+            </a:solidFill>
+            <a:ln>
+              <a:solidFill>
+                <a:schemeClr val="accent6">
+                  <a:lumMod val="75000"/>
+                </a:schemeClr>
+              </a:solidFill>
+            </a:ln>
+          </p:spPr>
+          <p:style>
+            <a:lnRef idx="2">
+              <a:schemeClr val="accent1">
+                <a:shade val="50000"/>
+              </a:schemeClr>
+            </a:lnRef>
+            <a:fillRef idx="1">
+              <a:schemeClr val="accent1"/>
+            </a:fillRef>
+            <a:effectRef idx="0">
+              <a:schemeClr val="accent1"/>
+            </a:effectRef>
+            <a:fontRef idx="minor">
+              <a:schemeClr val="lt1"/>
+            </a:fontRef>
+          </p:style>
+          <p:txBody>
+            <a:bodyPr rtlCol="0" anchor="ctr"/>
+            <a:lstStyle/>
+            <a:p>
+              <a:pPr algn="ctr"/>
+              <a:r>
+                <a:rPr lang="en-US" sz="1200" dirty="0"/>
+                <a:t>Hazard event distribution </a:t>
+              </a:r>
+            </a:p>
+          </p:txBody>
+        </p:sp>
+        <p:cxnSp>
+          <p:nvCxnSpPr>
+            <p:cNvPr id="123" name="Connector: Elbow 49">
+              <a:extLst>
+                <a:ext uri="{FF2B5EF4-FFF2-40B4-BE49-F238E27FC236}">
+                  <a16:creationId xmlns:a16="http://schemas.microsoft.com/office/drawing/2014/main" id="{F9E24599-60F9-43A3-14D0-5A7A5570D83F}"/>
+                </a:ext>
+              </a:extLst>
+            </p:cNvPr>
+            <p:cNvCxnSpPr>
+              <a:cxnSpLocks/>
+              <a:stCxn id="119" idx="3"/>
+              <a:endCxn id="121" idx="1"/>
+            </p:cNvCxnSpPr>
+            <p:nvPr/>
+          </p:nvCxnSpPr>
+          <p:spPr>
+            <a:xfrm flipV="1">
+              <a:off x="4510766" y="5106944"/>
+              <a:ext cx="430086" cy="545772"/>
+            </a:xfrm>
+            <a:prstGeom prst="bentConnector3">
+              <a:avLst>
+                <a:gd name="adj1" fmla="val 50000"/>
+              </a:avLst>
+            </a:prstGeom>
+            <a:ln>
+              <a:tailEnd type="triangle"/>
+            </a:ln>
+          </p:spPr>
+          <p:style>
+            <a:lnRef idx="1">
+              <a:schemeClr val="accent1"/>
+            </a:lnRef>
+            <a:fillRef idx="0">
+              <a:schemeClr val="accent1"/>
+            </a:fillRef>
+            <a:effectRef idx="0">
+              <a:schemeClr val="accent1"/>
+            </a:effectRef>
+            <a:fontRef idx="minor">
+              <a:schemeClr val="tx1"/>
+            </a:fontRef>
+          </p:style>
+        </p:cxnSp>
+        <p:cxnSp>
+          <p:nvCxnSpPr>
+            <p:cNvPr id="125" name="Connector: Elbow 49">
+              <a:extLst>
+                <a:ext uri="{FF2B5EF4-FFF2-40B4-BE49-F238E27FC236}">
+                  <a16:creationId xmlns:a16="http://schemas.microsoft.com/office/drawing/2014/main" id="{B122DB1D-89D1-9A9B-117D-32D9142A042D}"/>
+                </a:ext>
+              </a:extLst>
+            </p:cNvPr>
+            <p:cNvCxnSpPr>
+              <a:cxnSpLocks/>
+              <a:endCxn id="48" idx="1"/>
+            </p:cNvCxnSpPr>
+            <p:nvPr/>
+          </p:nvCxnSpPr>
+          <p:spPr>
+            <a:xfrm rot="16200000" flipH="1">
+              <a:off x="4440947" y="5814777"/>
+              <a:ext cx="840163" cy="270439"/>
+            </a:xfrm>
+            <a:prstGeom prst="bentConnector2">
+              <a:avLst/>
+            </a:prstGeom>
+            <a:ln>
+              <a:tailEnd type="triangle"/>
+            </a:ln>
+          </p:spPr>
+          <p:style>
+            <a:lnRef idx="1">
+              <a:schemeClr val="accent1"/>
+            </a:lnRef>
+            <a:fillRef idx="0">
+              <a:schemeClr val="accent1"/>
+            </a:fillRef>
+            <a:effectRef idx="0">
+              <a:schemeClr val="accent1"/>
+            </a:effectRef>
+            <a:fontRef idx="minor">
+              <a:schemeClr val="tx1"/>
+            </a:fontRef>
+          </p:style>
+        </p:cxnSp>
+      </p:grpSp>
+      <p:sp>
+        <p:nvSpPr>
+          <p:cNvPr id="136" name="TextBox 135">
+            <a:extLst>
+              <a:ext uri="{FF2B5EF4-FFF2-40B4-BE49-F238E27FC236}">
+                <a16:creationId xmlns:a16="http://schemas.microsoft.com/office/drawing/2014/main" id="{81C2A37A-FA92-E845-2F55-E6ABF150710F}"/>
+              </a:ext>
+            </a:extLst>
+          </p:cNvPr>
+          <p:cNvSpPr txBox="1"/>
+          <p:nvPr/>
+        </p:nvSpPr>
+        <p:spPr>
+          <a:xfrm>
+            <a:off x="6563469" y="5912133"/>
+            <a:ext cx="2358499" cy="646331"/>
+          </a:xfrm>
+          <a:prstGeom prst="rect">
+            <a:avLst/>
+          </a:prstGeom>
+          <a:noFill/>
+        </p:spPr>
+        <p:txBody>
+          <a:bodyPr wrap="square" rtlCol="0">
+            <a:spAutoFit/>
+          </a:bodyPr>
+          <a:lstStyle/>
+          <a:p>
+            <a:r>
+              <a:rPr lang="en-US" dirty="0">
+                <a:solidFill>
+                  <a:schemeClr val="accent5">
+                    <a:lumMod val="75000"/>
+                  </a:schemeClr>
+                </a:solidFill>
+              </a:rPr>
+              <a:t>Acute hazard vulnerability model</a:t>
+            </a:r>
+          </a:p>
+        </p:txBody>
+      </p:sp>
+      <p:cxnSp>
+        <p:nvCxnSpPr>
+          <p:cNvPr id="138" name="Straight Connector 137">
+            <a:extLst>
+              <a:ext uri="{FF2B5EF4-FFF2-40B4-BE49-F238E27FC236}">
+                <a16:creationId xmlns:a16="http://schemas.microsoft.com/office/drawing/2014/main" id="{E5DC3FDA-EB7D-5697-1051-FBCE9FBBC62D}"/>
+              </a:ext>
+            </a:extLst>
+          </p:cNvPr>
+          <p:cNvCxnSpPr>
+            <a:cxnSpLocks/>
+          </p:cNvCxnSpPr>
+          <p:nvPr/>
+        </p:nvCxnSpPr>
+        <p:spPr>
+          <a:xfrm flipH="1">
+            <a:off x="3106402" y="3149744"/>
+            <a:ext cx="4610379" cy="1475819"/>
+          </a:xfrm>
+          <a:prstGeom prst="line">
+            <a:avLst/>
+          </a:prstGeom>
+          <a:ln>
+            <a:prstDash val="dash"/>
+          </a:ln>
+        </p:spPr>
+        <p:style>
+          <a:lnRef idx="1">
+            <a:schemeClr val="accent1"/>
+          </a:lnRef>
+          <a:fillRef idx="0">
+            <a:schemeClr val="accent1"/>
+          </a:fillRef>
+          <a:effectRef idx="0">
+            <a:schemeClr val="accent1"/>
+          </a:effectRef>
+          <a:fontRef idx="minor">
+            <a:schemeClr val="tx1"/>
+          </a:fontRef>
+        </p:style>
+      </p:cxnSp>
+      <p:cxnSp>
+        <p:nvCxnSpPr>
+          <p:cNvPr id="139" name="Straight Connector 138">
+            <a:extLst>
+              <a:ext uri="{FF2B5EF4-FFF2-40B4-BE49-F238E27FC236}">
+                <a16:creationId xmlns:a16="http://schemas.microsoft.com/office/drawing/2014/main" id="{133679F3-FD8B-AD20-A6C0-73BA87D4874B}"/>
+              </a:ext>
+            </a:extLst>
+          </p:cNvPr>
+          <p:cNvCxnSpPr>
+            <a:cxnSpLocks/>
+          </p:cNvCxnSpPr>
+          <p:nvPr/>
+        </p:nvCxnSpPr>
+        <p:spPr>
+          <a:xfrm flipH="1">
+            <a:off x="8609403" y="3552760"/>
+            <a:ext cx="725048" cy="1130050"/>
+          </a:xfrm>
+          <a:prstGeom prst="line">
+            <a:avLst/>
+          </a:prstGeom>
+          <a:ln>
+            <a:prstDash val="dash"/>
+          </a:ln>
+        </p:spPr>
+        <p:style>
+          <a:lnRef idx="1">
+            <a:schemeClr val="accent1"/>
+          </a:lnRef>
+          <a:fillRef idx="0">
+            <a:schemeClr val="accent1"/>
+          </a:fillRef>
+          <a:effectRef idx="0">
+            <a:schemeClr val="accent1"/>
+          </a:effectRef>
+          <a:fontRef idx="minor">
+            <a:schemeClr val="tx1"/>
+          </a:fontRef>
+        </p:style>
+      </p:cxnSp>
     </p:spTree>
     <p:extLst>
       <p:ext uri="{BB962C8B-B14F-4D97-AF65-F5344CB8AC3E}">

</xml_diff>